<commit_message>
Demo buoi 13 bootstrap
</commit_message>
<xml_diff>
--- a/tai-lieu/fe/Lession14. Bootstrap/Bai14-Bootstrap.pptx
+++ b/tai-lieu/fe/Lession14. Bootstrap/Bai14-Bootstrap.pptx
@@ -345,7 +345,7 @@
           <a:p>
             <a:fld id="{7109C2E1-7128-4CF3-932E-985565988C28}" type="datetimeFigureOut">
               <a:rPr lang="en-US" smtClean="0"/>
-              <a:t>8/16/2020</a:t>
+              <a:t>10/30/2021</a:t>
             </a:fld>
             <a:endParaRPr lang="en-US"/>
           </a:p>
@@ -513,7 +513,7 @@
           <a:p>
             <a:fld id="{7109C2E1-7128-4CF3-932E-985565988C28}" type="datetimeFigureOut">
               <a:rPr lang="en-US" smtClean="0"/>
-              <a:t>8/16/2020</a:t>
+              <a:t>10/30/2021</a:t>
             </a:fld>
             <a:endParaRPr lang="en-US"/>
           </a:p>
@@ -691,7 +691,7 @@
           <a:p>
             <a:fld id="{7109C2E1-7128-4CF3-932E-985565988C28}" type="datetimeFigureOut">
               <a:rPr lang="en-US" smtClean="0"/>
-              <a:t>8/16/2020</a:t>
+              <a:t>10/30/2021</a:t>
             </a:fld>
             <a:endParaRPr lang="en-US"/>
           </a:p>
@@ -859,7 +859,7 @@
           <a:p>
             <a:fld id="{7109C2E1-7128-4CF3-932E-985565988C28}" type="datetimeFigureOut">
               <a:rPr lang="en-US" smtClean="0"/>
-              <a:t>8/16/2020</a:t>
+              <a:t>10/30/2021</a:t>
             </a:fld>
             <a:endParaRPr lang="en-US"/>
           </a:p>
@@ -1104,7 +1104,7 @@
           <a:p>
             <a:fld id="{7109C2E1-7128-4CF3-932E-985565988C28}" type="datetimeFigureOut">
               <a:rPr lang="en-US" smtClean="0"/>
-              <a:t>8/16/2020</a:t>
+              <a:t>10/30/2021</a:t>
             </a:fld>
             <a:endParaRPr lang="en-US"/>
           </a:p>
@@ -1389,7 +1389,7 @@
           <a:p>
             <a:fld id="{7109C2E1-7128-4CF3-932E-985565988C28}" type="datetimeFigureOut">
               <a:rPr lang="en-US" smtClean="0"/>
-              <a:t>8/16/2020</a:t>
+              <a:t>10/30/2021</a:t>
             </a:fld>
             <a:endParaRPr lang="en-US"/>
           </a:p>
@@ -1808,7 +1808,7 @@
           <a:p>
             <a:fld id="{7109C2E1-7128-4CF3-932E-985565988C28}" type="datetimeFigureOut">
               <a:rPr lang="en-US" smtClean="0"/>
-              <a:t>8/16/2020</a:t>
+              <a:t>10/30/2021</a:t>
             </a:fld>
             <a:endParaRPr lang="en-US"/>
           </a:p>
@@ -1925,7 +1925,7 @@
           <a:p>
             <a:fld id="{7109C2E1-7128-4CF3-932E-985565988C28}" type="datetimeFigureOut">
               <a:rPr lang="en-US" smtClean="0"/>
-              <a:t>8/16/2020</a:t>
+              <a:t>10/30/2021</a:t>
             </a:fld>
             <a:endParaRPr lang="en-US"/>
           </a:p>
@@ -2020,7 +2020,7 @@
           <a:p>
             <a:fld id="{7109C2E1-7128-4CF3-932E-985565988C28}" type="datetimeFigureOut">
               <a:rPr lang="en-US" smtClean="0"/>
-              <a:t>8/16/2020</a:t>
+              <a:t>10/30/2021</a:t>
             </a:fld>
             <a:endParaRPr lang="en-US"/>
           </a:p>
@@ -2295,7 +2295,7 @@
           <a:p>
             <a:fld id="{7109C2E1-7128-4CF3-932E-985565988C28}" type="datetimeFigureOut">
               <a:rPr lang="en-US" smtClean="0"/>
-              <a:t>8/16/2020</a:t>
+              <a:t>10/30/2021</a:t>
             </a:fld>
             <a:endParaRPr lang="en-US"/>
           </a:p>
@@ -2547,7 +2547,7 @@
           <a:p>
             <a:fld id="{7109C2E1-7128-4CF3-932E-985565988C28}" type="datetimeFigureOut">
               <a:rPr lang="en-US" smtClean="0"/>
-              <a:t>8/16/2020</a:t>
+              <a:t>10/30/2021</a:t>
             </a:fld>
             <a:endParaRPr lang="en-US"/>
           </a:p>
@@ -2758,7 +2758,7 @@
           <a:p>
             <a:fld id="{7109C2E1-7128-4CF3-932E-985565988C28}" type="datetimeFigureOut">
               <a:rPr lang="en-US" smtClean="0"/>
-              <a:t>8/16/2020</a:t>
+              <a:t>10/30/2021</a:t>
             </a:fld>
             <a:endParaRPr lang="en-US"/>
           </a:p>
@@ -6885,12 +6885,16 @@
           <a:p>
             <a:pPr algn="ctr"/>
             <a:r>
-              <a:rPr lang="en-US" sz="2400" i="1" u="sng" dirty="0">
-                <a:latin typeface="Arial" panose="020B0604020202020204" pitchFamily="34" charset="0"/>
-                <a:cs typeface="Arial" panose="020B0604020202020204" pitchFamily="34" charset="0"/>
-              </a:rPr>
-              <a:t>https://www.w3schools.com/bootstrap4/trybs_template1.htm#</a:t>
-            </a:r>
+              <a:rPr lang="en-US" sz="2400" i="1" u="sng">
+                <a:latin typeface="Arial" panose="020B0604020202020204" pitchFamily="34" charset="0"/>
+                <a:cs typeface="Arial" panose="020B0604020202020204" pitchFamily="34" charset="0"/>
+              </a:rPr>
+              <a:t>https://www.w3schools.com/bootstrap5/trybs_template1.htm#</a:t>
+            </a:r>
+            <a:endParaRPr lang="en-US" sz="2400" i="1" u="sng" dirty="0">
+              <a:latin typeface="Arial" panose="020B0604020202020204" pitchFamily="34" charset="0"/>
+              <a:cs typeface="Arial" panose="020B0604020202020204" pitchFamily="34" charset="0"/>
+            </a:endParaRPr>
           </a:p>
         </p:txBody>
       </p:sp>
@@ -9250,8 +9254,19 @@
                 <a:latin typeface="Arial" panose="020B0604020202020204" pitchFamily="34" charset="0"/>
                 <a:cs typeface="Arial" panose="020B0604020202020204" pitchFamily="34" charset="0"/>
               </a:rPr>
-              <a:t> 576px</a:t>
-            </a:r>
+              <a:t> </a:t>
+            </a:r>
+            <a:r>
+              <a:rPr lang="en-US" sz="2400" dirty="0" smtClean="0">
+                <a:latin typeface="Arial" panose="020B0604020202020204" pitchFamily="34" charset="0"/>
+                <a:cs typeface="Arial" panose="020B0604020202020204" pitchFamily="34" charset="0"/>
+              </a:rPr>
+              <a:t>576px //small</a:t>
+            </a:r>
+            <a:endParaRPr lang="en-US" sz="2400" dirty="0">
+              <a:latin typeface="Arial" panose="020B0604020202020204" pitchFamily="34" charset="0"/>
+              <a:cs typeface="Arial" panose="020B0604020202020204" pitchFamily="34" charset="0"/>
+            </a:endParaRPr>
           </a:p>
           <a:p>
             <a:pPr lvl="1"/>
@@ -9347,8 +9362,19 @@
                 <a:latin typeface="Arial" panose="020B0604020202020204" pitchFamily="34" charset="0"/>
                 <a:cs typeface="Arial" panose="020B0604020202020204" pitchFamily="34" charset="0"/>
               </a:rPr>
-              <a:t> 768px</a:t>
-            </a:r>
+              <a:t> </a:t>
+            </a:r>
+            <a:r>
+              <a:rPr lang="en-US" sz="2400" dirty="0" smtClean="0">
+                <a:latin typeface="Arial" panose="020B0604020202020204" pitchFamily="34" charset="0"/>
+                <a:cs typeface="Arial" panose="020B0604020202020204" pitchFamily="34" charset="0"/>
+              </a:rPr>
+              <a:t>768px //medium</a:t>
+            </a:r>
+            <a:endParaRPr lang="en-US" sz="2400" dirty="0">
+              <a:latin typeface="Arial" panose="020B0604020202020204" pitchFamily="34" charset="0"/>
+              <a:cs typeface="Arial" panose="020B0604020202020204" pitchFamily="34" charset="0"/>
+            </a:endParaRPr>
           </a:p>
           <a:p>
             <a:pPr lvl="1"/>
@@ -9464,8 +9490,19 @@
                 <a:latin typeface="Arial" panose="020B0604020202020204" pitchFamily="34" charset="0"/>
                 <a:cs typeface="Arial" panose="020B0604020202020204" pitchFamily="34" charset="0"/>
               </a:rPr>
-              <a:t> 992px</a:t>
-            </a:r>
+              <a:t> </a:t>
+            </a:r>
+            <a:r>
+              <a:rPr lang="en-US" sz="2400" dirty="0" smtClean="0">
+                <a:latin typeface="Arial" panose="020B0604020202020204" pitchFamily="34" charset="0"/>
+                <a:cs typeface="Arial" panose="020B0604020202020204" pitchFamily="34" charset="0"/>
+              </a:rPr>
+              <a:t>992px //large</a:t>
+            </a:r>
+            <a:endParaRPr lang="en-US" sz="2400" dirty="0">
+              <a:latin typeface="Arial" panose="020B0604020202020204" pitchFamily="34" charset="0"/>
+              <a:cs typeface="Arial" panose="020B0604020202020204" pitchFamily="34" charset="0"/>
+            </a:endParaRPr>
           </a:p>
           <a:p>
             <a:pPr lvl="1"/>
@@ -9561,8 +9598,19 @@
                 <a:latin typeface="Arial" panose="020B0604020202020204" pitchFamily="34" charset="0"/>
                 <a:cs typeface="Arial" panose="020B0604020202020204" pitchFamily="34" charset="0"/>
               </a:rPr>
-              <a:t> 1200px</a:t>
-            </a:r>
+              <a:t> </a:t>
+            </a:r>
+            <a:r>
+              <a:rPr lang="en-US" sz="2400" dirty="0" smtClean="0">
+                <a:latin typeface="Arial" panose="020B0604020202020204" pitchFamily="34" charset="0"/>
+                <a:cs typeface="Arial" panose="020B0604020202020204" pitchFamily="34" charset="0"/>
+              </a:rPr>
+              <a:t>1200px //x large</a:t>
+            </a:r>
+            <a:endParaRPr lang="en-US" sz="2400" dirty="0">
+              <a:latin typeface="Arial" panose="020B0604020202020204" pitchFamily="34" charset="0"/>
+              <a:cs typeface="Arial" panose="020B0604020202020204" pitchFamily="34" charset="0"/>
+            </a:endParaRPr>
           </a:p>
           <a:p>
             <a:pPr lvl="1"/>
@@ -12679,7 +12727,7 @@
           <p:cNvPr id="10" name="TextBox 9">
             <a:extLst>
               <a:ext uri="{FF2B5EF4-FFF2-40B4-BE49-F238E27FC236}">
-                <a16:creationId xmlns:a16="http://schemas.microsoft.com/office/drawing/2014/main" id="{4030C79B-F7EB-4280-A87E-3A2145A015AD}"/>
+                <a16:creationId xmlns:a16="http://schemas.microsoft.com/office/drawing/2014/main" xmlns="" id="{4030C79B-F7EB-4280-A87E-3A2145A015AD}"/>
               </a:ext>
             </a:extLst>
           </p:cNvPr>

</xml_diff>